<commit_message>
Poster: show FPGA location in isac chain
</commit_message>
<xml_diff>
--- a/presentables/posters/poster_diagrams.pptx
+++ b/presentables/posters/poster_diagrams.pptx
@@ -5964,8 +5964,8 @@
         </p:nvSpPr>
         <p:spPr bwMode="auto">
           <a:xfrm flipH="0" flipV="0">
-            <a:off x="7284188" y="5405552"/>
-            <a:ext cx="2250031" cy="427079"/>
+            <a:off x="6162594" y="5405731"/>
+            <a:ext cx="4250710" cy="427079"/>
           </a:xfrm>
           <a:prstGeom prst="rect">
             <a:avLst/>
@@ -5988,7 +5988,7 @@
                 <a:latin typeface="Montserrat"/>
                 <a:cs typeface="Montserrat"/>
               </a:rPr>
-              <a:t>Receiver</a:t>
+              <a:t>Receiver (with FPGA)</a:t>
             </a:r>
             <a:endParaRPr sz="2200" b="0">
               <a:solidFill>
@@ -6052,7 +6052,7 @@
                 <a:ea typeface="Montserrat"/>
                 <a:cs typeface="Montserrat"/>
               </a:rPr>
-              <a:t>010110101</a:t>
+              <a:t>OFDM</a:t>
             </a:r>
             <a:endParaRPr sz="2200">
               <a:solidFill>
@@ -6116,7 +6116,7 @@
                 <a:ea typeface="Montserrat"/>
                 <a:cs typeface="Montserrat"/>
               </a:rPr>
-              <a:t>010110101</a:t>
+              <a:t>OFDM</a:t>
             </a:r>
             <a:endParaRPr sz="2200">
               <a:solidFill>
@@ -6268,6 +6268,34 @@
           </a:fontRef>
         </p:style>
       </p:cxnSp>
+      <p:pic>
+        <p:nvPicPr>
+          <p:cNvPr id="1714761464" name=""/>
+          <p:cNvPicPr>
+            <a:picLocks noChangeAspect="1"/>
+          </p:cNvPicPr>
+          <p:nvPr/>
+        </p:nvPicPr>
+        <p:blipFill>
+          <a:blip r:embed="rId12">
+            <a:extLst>
+              <a:ext uri="{96DAC541-7B7A-43D3-8B79-37D633B846F1}">
+                <asvg:svgBlip xmlns:asvg="http://schemas.microsoft.com/office/drawing/2016/SVG/main" r:embed="rId13"/>
+              </a:ext>
+            </a:extLst>
+          </a:blip>
+          <a:stretch/>
+        </p:blipFill>
+        <p:spPr bwMode="auto">
+          <a:xfrm flipH="0" flipV="0">
+            <a:off x="7601504" y="4795267"/>
+            <a:ext cx="431359" cy="431359"/>
+          </a:xfrm>
+          <a:prstGeom prst="rect">
+            <a:avLst/>
+          </a:prstGeom>
+        </p:spPr>
+      </p:pic>
     </p:spTree>
   </p:cSld>
   <p:clrMapOvr>

</xml_diff>